<commit_message>
capacitacion php puro softura feb 2022 - sesion 4
</commit_message>
<xml_diff>
--- a/documentacion/Presentación1.pptx
+++ b/documentacion/Presentación1.pptx
@@ -8,6 +8,8 @@
     <p:sldId id="256" r:id="rId2"/>
     <p:sldId id="257" r:id="rId3"/>
     <p:sldId id="258" r:id="rId4"/>
+    <p:sldId id="259" r:id="rId5"/>
+    <p:sldId id="260" r:id="rId6"/>
   </p:sldIdLst>
   <p:sldSz cx="12192000" cy="6858000"/>
   <p:notesSz cx="6858000" cy="9144000"/>
@@ -106,6 +108,11 @@
       </a:defRPr>
     </a:lvl9pPr>
   </p:defaultTextStyle>
+  <p:extLst>
+    <p:ext uri="{EFAFB233-063F-42B5-8137-9DF3F51BA10A}">
+      <p15:sldGuideLst xmlns:p15="http://schemas.microsoft.com/office/powerpoint/2012/main"/>
+    </p:ext>
+  </p:extLst>
 </p:presentation>
 </file>
 
@@ -258,7 +265,7 @@
           <a:p>
             <a:fld id="{8AB06734-7183-4404-A236-7CBFED046C3A}" type="datetimeFigureOut">
               <a:rPr lang="es-MX" smtClean="0"/>
-              <a:t>21/02/2022</a:t>
+              <a:t>24/02/2022</a:t>
             </a:fld>
             <a:endParaRPr lang="es-MX"/>
           </a:p>
@@ -458,7 +465,7 @@
           <a:p>
             <a:fld id="{8AB06734-7183-4404-A236-7CBFED046C3A}" type="datetimeFigureOut">
               <a:rPr lang="es-MX" smtClean="0"/>
-              <a:t>21/02/2022</a:t>
+              <a:t>24/02/2022</a:t>
             </a:fld>
             <a:endParaRPr lang="es-MX"/>
           </a:p>
@@ -668,7 +675,7 @@
           <a:p>
             <a:fld id="{8AB06734-7183-4404-A236-7CBFED046C3A}" type="datetimeFigureOut">
               <a:rPr lang="es-MX" smtClean="0"/>
-              <a:t>21/02/2022</a:t>
+              <a:t>24/02/2022</a:t>
             </a:fld>
             <a:endParaRPr lang="es-MX"/>
           </a:p>
@@ -868,7 +875,7 @@
           <a:p>
             <a:fld id="{8AB06734-7183-4404-A236-7CBFED046C3A}" type="datetimeFigureOut">
               <a:rPr lang="es-MX" smtClean="0"/>
-              <a:t>21/02/2022</a:t>
+              <a:t>24/02/2022</a:t>
             </a:fld>
             <a:endParaRPr lang="es-MX"/>
           </a:p>
@@ -1144,7 +1151,7 @@
           <a:p>
             <a:fld id="{8AB06734-7183-4404-A236-7CBFED046C3A}" type="datetimeFigureOut">
               <a:rPr lang="es-MX" smtClean="0"/>
-              <a:t>21/02/2022</a:t>
+              <a:t>24/02/2022</a:t>
             </a:fld>
             <a:endParaRPr lang="es-MX"/>
           </a:p>
@@ -1412,7 +1419,7 @@
           <a:p>
             <a:fld id="{8AB06734-7183-4404-A236-7CBFED046C3A}" type="datetimeFigureOut">
               <a:rPr lang="es-MX" smtClean="0"/>
-              <a:t>21/02/2022</a:t>
+              <a:t>24/02/2022</a:t>
             </a:fld>
             <a:endParaRPr lang="es-MX"/>
           </a:p>
@@ -1827,7 +1834,7 @@
           <a:p>
             <a:fld id="{8AB06734-7183-4404-A236-7CBFED046C3A}" type="datetimeFigureOut">
               <a:rPr lang="es-MX" smtClean="0"/>
-              <a:t>21/02/2022</a:t>
+              <a:t>24/02/2022</a:t>
             </a:fld>
             <a:endParaRPr lang="es-MX"/>
           </a:p>
@@ -1969,7 +1976,7 @@
           <a:p>
             <a:fld id="{8AB06734-7183-4404-A236-7CBFED046C3A}" type="datetimeFigureOut">
               <a:rPr lang="es-MX" smtClean="0"/>
-              <a:t>21/02/2022</a:t>
+              <a:t>24/02/2022</a:t>
             </a:fld>
             <a:endParaRPr lang="es-MX"/>
           </a:p>
@@ -2082,7 +2089,7 @@
           <a:p>
             <a:fld id="{8AB06734-7183-4404-A236-7CBFED046C3A}" type="datetimeFigureOut">
               <a:rPr lang="es-MX" smtClean="0"/>
-              <a:t>21/02/2022</a:t>
+              <a:t>24/02/2022</a:t>
             </a:fld>
             <a:endParaRPr lang="es-MX"/>
           </a:p>
@@ -2395,7 +2402,7 @@
           <a:p>
             <a:fld id="{8AB06734-7183-4404-A236-7CBFED046C3A}" type="datetimeFigureOut">
               <a:rPr lang="es-MX" smtClean="0"/>
-              <a:t>21/02/2022</a:t>
+              <a:t>24/02/2022</a:t>
             </a:fld>
             <a:endParaRPr lang="es-MX"/>
           </a:p>
@@ -2684,7 +2691,7 @@
           <a:p>
             <a:fld id="{8AB06734-7183-4404-A236-7CBFED046C3A}" type="datetimeFigureOut">
               <a:rPr lang="es-MX" smtClean="0"/>
-              <a:t>21/02/2022</a:t>
+              <a:t>24/02/2022</a:t>
             </a:fld>
             <a:endParaRPr lang="es-MX"/>
           </a:p>
@@ -2927,7 +2934,7 @@
           <a:p>
             <a:fld id="{8AB06734-7183-4404-A236-7CBFED046C3A}" type="datetimeFigureOut">
               <a:rPr lang="es-MX" smtClean="0"/>
-              <a:t>21/02/2022</a:t>
+              <a:t>24/02/2022</a:t>
             </a:fld>
             <a:endParaRPr lang="es-MX"/>
           </a:p>
@@ -4138,6 +4145,1269 @@
 </p:sld>
 </file>
 
+<file path=ppt/slides/slide4.xml><?xml version="1.0" encoding="utf-8"?>
+<p:sld xmlns:a="http://schemas.openxmlformats.org/drawingml/2006/main" xmlns:r="http://schemas.openxmlformats.org/officeDocument/2006/relationships" xmlns:p="http://schemas.openxmlformats.org/presentationml/2006/main">
+  <p:cSld>
+    <p:spTree>
+      <p:nvGrpSpPr>
+        <p:cNvPr id="1" name=""/>
+        <p:cNvGrpSpPr/>
+        <p:nvPr/>
+      </p:nvGrpSpPr>
+      <p:grpSpPr>
+        <a:xfrm>
+          <a:off x="0" y="0"/>
+          <a:ext cx="0" cy="0"/>
+          <a:chOff x="0" y="0"/>
+          <a:chExt cx="0" cy="0"/>
+        </a:xfrm>
+      </p:grpSpPr>
+      <p:sp>
+        <p:nvSpPr>
+          <p:cNvPr id="4" name="Rectángulo: esquinas redondeadas 3">
+            <a:extLst>
+              <a:ext uri="{FF2B5EF4-FFF2-40B4-BE49-F238E27FC236}">
+                <a16:creationId xmlns:a16="http://schemas.microsoft.com/office/drawing/2014/main" id="{3CA911BC-BD1D-4896-82A6-9CF343F68280}"/>
+              </a:ext>
+            </a:extLst>
+          </p:cNvPr>
+          <p:cNvSpPr/>
+          <p:nvPr/>
+        </p:nvSpPr>
+        <p:spPr>
+          <a:xfrm>
+            <a:off x="5156556" y="785611"/>
+            <a:ext cx="2163651" cy="888642"/>
+          </a:xfrm>
+          <a:prstGeom prst="roundRect">
+            <a:avLst/>
+          </a:prstGeom>
+        </p:spPr>
+        <p:style>
+          <a:lnRef idx="2">
+            <a:schemeClr val="accent1">
+              <a:shade val="50000"/>
+            </a:schemeClr>
+          </a:lnRef>
+          <a:fillRef idx="1">
+            <a:schemeClr val="accent1"/>
+          </a:fillRef>
+          <a:effectRef idx="0">
+            <a:schemeClr val="accent1"/>
+          </a:effectRef>
+          <a:fontRef idx="minor">
+            <a:schemeClr val="lt1"/>
+          </a:fontRef>
+        </p:style>
+        <p:txBody>
+          <a:bodyPr rtlCol="0" anchor="ctr"/>
+          <a:lstStyle/>
+          <a:p>
+            <a:pPr algn="ctr"/>
+            <a:r>
+              <a:rPr lang="es-MX" dirty="0"/>
+              <a:t>agregar</a:t>
+            </a:r>
+          </a:p>
+        </p:txBody>
+      </p:sp>
+      <p:graphicFrame>
+        <p:nvGraphicFramePr>
+          <p:cNvPr id="5" name="Tabla 5">
+            <a:extLst>
+              <a:ext uri="{FF2B5EF4-FFF2-40B4-BE49-F238E27FC236}">
+                <a16:creationId xmlns:a16="http://schemas.microsoft.com/office/drawing/2014/main" id="{9F3756E6-C82F-462D-AB2F-80C681D5D800}"/>
+              </a:ext>
+            </a:extLst>
+          </p:cNvPr>
+          <p:cNvGraphicFramePr>
+            <a:graphicFrameLocks noGrp="1"/>
+          </p:cNvGraphicFramePr>
+          <p:nvPr>
+            <p:extLst>
+              <p:ext uri="{D42A27DB-BD31-4B8C-83A1-F6EECF244321}">
+                <p14:modId xmlns:p14="http://schemas.microsoft.com/office/powerpoint/2010/main" val="3672089063"/>
+              </p:ext>
+            </p:extLst>
+          </p:nvPr>
+        </p:nvGraphicFramePr>
+        <p:xfrm>
+          <a:off x="1143356" y="2201474"/>
+          <a:ext cx="10859754" cy="4424181"/>
+        </p:xfrm>
+        <a:graphic>
+          <a:graphicData uri="http://schemas.openxmlformats.org/drawingml/2006/table">
+            <a:tbl>
+              <a:tblPr firstRow="1" bandRow="1">
+                <a:tableStyleId>{5C22544A-7EE6-4342-B048-85BDC9FD1C3A}</a:tableStyleId>
+              </a:tblPr>
+              <a:tblGrid>
+                <a:gridCol w="1809959">
+                  <a:extLst>
+                    <a:ext uri="{9D8B030D-6E8A-4147-A177-3AD203B41FA5}">
+                      <a16:colId xmlns:a16="http://schemas.microsoft.com/office/drawing/2014/main" val="88993670"/>
+                    </a:ext>
+                  </a:extLst>
+                </a:gridCol>
+                <a:gridCol w="1809959">
+                  <a:extLst>
+                    <a:ext uri="{9D8B030D-6E8A-4147-A177-3AD203B41FA5}">
+                      <a16:colId xmlns:a16="http://schemas.microsoft.com/office/drawing/2014/main" val="1234242617"/>
+                    </a:ext>
+                  </a:extLst>
+                </a:gridCol>
+                <a:gridCol w="1809959">
+                  <a:extLst>
+                    <a:ext uri="{9D8B030D-6E8A-4147-A177-3AD203B41FA5}">
+                      <a16:colId xmlns:a16="http://schemas.microsoft.com/office/drawing/2014/main" val="3979334384"/>
+                    </a:ext>
+                  </a:extLst>
+                </a:gridCol>
+                <a:gridCol w="1809959">
+                  <a:extLst>
+                    <a:ext uri="{9D8B030D-6E8A-4147-A177-3AD203B41FA5}">
+                      <a16:colId xmlns:a16="http://schemas.microsoft.com/office/drawing/2014/main" val="1515200730"/>
+                    </a:ext>
+                  </a:extLst>
+                </a:gridCol>
+                <a:gridCol w="1809959">
+                  <a:extLst>
+                    <a:ext uri="{9D8B030D-6E8A-4147-A177-3AD203B41FA5}">
+                      <a16:colId xmlns:a16="http://schemas.microsoft.com/office/drawing/2014/main" val="693978088"/>
+                    </a:ext>
+                  </a:extLst>
+                </a:gridCol>
+                <a:gridCol w="1809959">
+                  <a:extLst>
+                    <a:ext uri="{9D8B030D-6E8A-4147-A177-3AD203B41FA5}">
+                      <a16:colId xmlns:a16="http://schemas.microsoft.com/office/drawing/2014/main" val="1293775686"/>
+                    </a:ext>
+                  </a:extLst>
+                </a:gridCol>
+              </a:tblGrid>
+              <a:tr h="987047">
+                <a:tc>
+                  <a:txBody>
+                    <a:bodyPr/>
+                    <a:lstStyle/>
+                    <a:p>
+                      <a:r>
+                        <a:rPr lang="es-MX" dirty="0"/>
+                        <a:t>id</a:t>
+                      </a:r>
+                    </a:p>
+                  </a:txBody>
+                  <a:tcPr/>
+                </a:tc>
+                <a:tc>
+                  <a:txBody>
+                    <a:bodyPr/>
+                    <a:lstStyle/>
+                    <a:p>
+                      <a:r>
+                        <a:rPr lang="es-MX" dirty="0"/>
+                        <a:t>Nombre completo</a:t>
+                      </a:r>
+                    </a:p>
+                  </a:txBody>
+                  <a:tcPr/>
+                </a:tc>
+                <a:tc>
+                  <a:txBody>
+                    <a:bodyPr/>
+                    <a:lstStyle/>
+                    <a:p>
+                      <a:r>
+                        <a:rPr lang="es-MX" dirty="0" err="1"/>
+                        <a:t>direccion</a:t>
+                      </a:r>
+                      <a:endParaRPr lang="es-MX" dirty="0"/>
+                    </a:p>
+                  </a:txBody>
+                  <a:tcPr/>
+                </a:tc>
+                <a:tc>
+                  <a:txBody>
+                    <a:bodyPr/>
+                    <a:lstStyle/>
+                    <a:p>
+                      <a:r>
+                        <a:rPr lang="es-MX" dirty="0"/>
+                        <a:t>cumpleaños</a:t>
+                      </a:r>
+                    </a:p>
+                  </a:txBody>
+                  <a:tcPr/>
+                </a:tc>
+                <a:tc>
+                  <a:txBody>
+                    <a:bodyPr/>
+                    <a:lstStyle/>
+                    <a:p>
+                      <a:r>
+                        <a:rPr lang="es-MX" dirty="0"/>
+                        <a:t>Datos de contacto</a:t>
+                      </a:r>
+                    </a:p>
+                  </a:txBody>
+                  <a:tcPr/>
+                </a:tc>
+                <a:tc>
+                  <a:txBody>
+                    <a:bodyPr/>
+                    <a:lstStyle/>
+                    <a:p>
+                      <a:r>
+                        <a:rPr lang="es-MX" dirty="0"/>
+                        <a:t>operaciones</a:t>
+                      </a:r>
+                    </a:p>
+                  </a:txBody>
+                  <a:tcPr/>
+                </a:tc>
+                <a:extLst>
+                  <a:ext uri="{0D108BD9-81ED-4DB2-BD59-A6C34878D82A}">
+                    <a16:rowId xmlns:a16="http://schemas.microsoft.com/office/drawing/2014/main" val="3247443732"/>
+                  </a:ext>
+                </a:extLst>
+              </a:tr>
+              <a:tr h="987047">
+                <a:tc>
+                  <a:txBody>
+                    <a:bodyPr/>
+                    <a:lstStyle/>
+                    <a:p>
+                      <a:r>
+                        <a:rPr lang="es-MX" dirty="0"/>
+                        <a:t>1</a:t>
+                      </a:r>
+                    </a:p>
+                  </a:txBody>
+                  <a:tcPr/>
+                </a:tc>
+                <a:tc>
+                  <a:txBody>
+                    <a:bodyPr/>
+                    <a:lstStyle/>
+                    <a:p>
+                      <a:r>
+                        <a:rPr lang="es-MX" dirty="0"/>
+                        <a:t>Enrique</a:t>
+                      </a:r>
+                    </a:p>
+                  </a:txBody>
+                  <a:tcPr/>
+                </a:tc>
+                <a:tc>
+                  <a:txBody>
+                    <a:bodyPr/>
+                    <a:lstStyle/>
+                    <a:p>
+                      <a:r>
+                        <a:rPr lang="es-MX" dirty="0"/>
+                        <a:t>Una calle x</a:t>
+                      </a:r>
+                    </a:p>
+                  </a:txBody>
+                  <a:tcPr/>
+                </a:tc>
+                <a:tc>
+                  <a:txBody>
+                    <a:bodyPr/>
+                    <a:lstStyle/>
+                    <a:p>
+                      <a:r>
+                        <a:rPr lang="es-MX" dirty="0"/>
+                        <a:t>01 de enero</a:t>
+                      </a:r>
+                    </a:p>
+                  </a:txBody>
+                  <a:tcPr/>
+                </a:tc>
+                <a:tc>
+                  <a:txBody>
+                    <a:bodyPr/>
+                    <a:lstStyle/>
+                    <a:p>
+                      <a:pPr marL="285750" indent="-285750">
+                        <a:buFont typeface="Arial" panose="020B0604020202020204" pitchFamily="34" charset="0"/>
+                        <a:buChar char="•"/>
+                      </a:pPr>
+                      <a:r>
+                        <a:rPr lang="es-MX" dirty="0"/>
+                        <a:t>teléfono: 246123654</a:t>
+                      </a:r>
+                    </a:p>
+                    <a:p>
+                      <a:pPr marL="285750" indent="-285750">
+                        <a:buFont typeface="Arial" panose="020B0604020202020204" pitchFamily="34" charset="0"/>
+                        <a:buChar char="•"/>
+                      </a:pPr>
+                      <a:r>
+                        <a:rPr lang="es-MX" dirty="0"/>
+                        <a:t>Correo: </a:t>
+                      </a:r>
+                      <a:r>
+                        <a:rPr lang="es-MX" dirty="0">
+                          <a:hlinkClick r:id="rId2"/>
+                        </a:rPr>
+                        <a:t>enriquecr@correo.com</a:t>
+                      </a:r>
+                      <a:endParaRPr lang="es-MX" dirty="0"/>
+                    </a:p>
+                  </a:txBody>
+                  <a:tcPr/>
+                </a:tc>
+                <a:tc>
+                  <a:txBody>
+                    <a:bodyPr/>
+                    <a:lstStyle/>
+                    <a:p>
+                      <a:endParaRPr lang="es-MX" dirty="0"/>
+                    </a:p>
+                  </a:txBody>
+                  <a:tcPr/>
+                </a:tc>
+                <a:extLst>
+                  <a:ext uri="{0D108BD9-81ED-4DB2-BD59-A6C34878D82A}">
+                    <a16:rowId xmlns:a16="http://schemas.microsoft.com/office/drawing/2014/main" val="3421369693"/>
+                  </a:ext>
+                </a:extLst>
+              </a:tr>
+              <a:tr h="987047">
+                <a:tc>
+                  <a:txBody>
+                    <a:bodyPr/>
+                    <a:lstStyle/>
+                    <a:p>
+                      <a:endParaRPr lang="es-MX"/>
+                    </a:p>
+                  </a:txBody>
+                  <a:tcPr/>
+                </a:tc>
+                <a:tc>
+                  <a:txBody>
+                    <a:bodyPr/>
+                    <a:lstStyle/>
+                    <a:p>
+                      <a:endParaRPr lang="es-MX"/>
+                    </a:p>
+                  </a:txBody>
+                  <a:tcPr/>
+                </a:tc>
+                <a:tc>
+                  <a:txBody>
+                    <a:bodyPr/>
+                    <a:lstStyle/>
+                    <a:p>
+                      <a:endParaRPr lang="es-MX"/>
+                    </a:p>
+                  </a:txBody>
+                  <a:tcPr/>
+                </a:tc>
+                <a:tc>
+                  <a:txBody>
+                    <a:bodyPr/>
+                    <a:lstStyle/>
+                    <a:p>
+                      <a:endParaRPr lang="es-MX"/>
+                    </a:p>
+                  </a:txBody>
+                  <a:tcPr/>
+                </a:tc>
+                <a:tc>
+                  <a:txBody>
+                    <a:bodyPr/>
+                    <a:lstStyle/>
+                    <a:p>
+                      <a:endParaRPr lang="es-MX"/>
+                    </a:p>
+                  </a:txBody>
+                  <a:tcPr/>
+                </a:tc>
+                <a:tc>
+                  <a:txBody>
+                    <a:bodyPr/>
+                    <a:lstStyle/>
+                    <a:p>
+                      <a:endParaRPr lang="es-MX"/>
+                    </a:p>
+                  </a:txBody>
+                  <a:tcPr/>
+                </a:tc>
+                <a:extLst>
+                  <a:ext uri="{0D108BD9-81ED-4DB2-BD59-A6C34878D82A}">
+                    <a16:rowId xmlns:a16="http://schemas.microsoft.com/office/drawing/2014/main" val="2954243689"/>
+                  </a:ext>
+                </a:extLst>
+              </a:tr>
+              <a:tr h="987047">
+                <a:tc>
+                  <a:txBody>
+                    <a:bodyPr/>
+                    <a:lstStyle/>
+                    <a:p>
+                      <a:endParaRPr lang="es-MX"/>
+                    </a:p>
+                  </a:txBody>
+                  <a:tcPr/>
+                </a:tc>
+                <a:tc>
+                  <a:txBody>
+                    <a:bodyPr/>
+                    <a:lstStyle/>
+                    <a:p>
+                      <a:endParaRPr lang="es-MX" dirty="0"/>
+                    </a:p>
+                  </a:txBody>
+                  <a:tcPr/>
+                </a:tc>
+                <a:tc>
+                  <a:txBody>
+                    <a:bodyPr/>
+                    <a:lstStyle/>
+                    <a:p>
+                      <a:endParaRPr lang="es-MX"/>
+                    </a:p>
+                  </a:txBody>
+                  <a:tcPr/>
+                </a:tc>
+                <a:tc>
+                  <a:txBody>
+                    <a:bodyPr/>
+                    <a:lstStyle/>
+                    <a:p>
+                      <a:endParaRPr lang="es-MX"/>
+                    </a:p>
+                  </a:txBody>
+                  <a:tcPr/>
+                </a:tc>
+                <a:tc>
+                  <a:txBody>
+                    <a:bodyPr/>
+                    <a:lstStyle/>
+                    <a:p>
+                      <a:endParaRPr lang="es-MX"/>
+                    </a:p>
+                  </a:txBody>
+                  <a:tcPr/>
+                </a:tc>
+                <a:tc>
+                  <a:txBody>
+                    <a:bodyPr/>
+                    <a:lstStyle/>
+                    <a:p>
+                      <a:endParaRPr lang="es-MX" dirty="0"/>
+                    </a:p>
+                  </a:txBody>
+                  <a:tcPr/>
+                </a:tc>
+                <a:extLst>
+                  <a:ext uri="{0D108BD9-81ED-4DB2-BD59-A6C34878D82A}">
+                    <a16:rowId xmlns:a16="http://schemas.microsoft.com/office/drawing/2014/main" val="3943673365"/>
+                  </a:ext>
+                </a:extLst>
+              </a:tr>
+            </a:tbl>
+          </a:graphicData>
+        </a:graphic>
+      </p:graphicFrame>
+      <p:sp>
+        <p:nvSpPr>
+          <p:cNvPr id="6" name="Rectángulo: esquinas redondeadas 5">
+            <a:extLst>
+              <a:ext uri="{FF2B5EF4-FFF2-40B4-BE49-F238E27FC236}">
+                <a16:creationId xmlns:a16="http://schemas.microsoft.com/office/drawing/2014/main" id="{4DD23AD0-AC35-4569-B6CA-F7C980263409}"/>
+              </a:ext>
+            </a:extLst>
+          </p:cNvPr>
+          <p:cNvSpPr/>
+          <p:nvPr/>
+        </p:nvSpPr>
+        <p:spPr>
+          <a:xfrm>
+            <a:off x="10585005" y="3429000"/>
+            <a:ext cx="463639" cy="579550"/>
+          </a:xfrm>
+          <a:prstGeom prst="roundRect">
+            <a:avLst/>
+          </a:prstGeom>
+        </p:spPr>
+        <p:style>
+          <a:lnRef idx="2">
+            <a:schemeClr val="accent4">
+              <a:shade val="50000"/>
+            </a:schemeClr>
+          </a:lnRef>
+          <a:fillRef idx="1">
+            <a:schemeClr val="accent4"/>
+          </a:fillRef>
+          <a:effectRef idx="0">
+            <a:schemeClr val="accent4"/>
+          </a:effectRef>
+          <a:fontRef idx="minor">
+            <a:schemeClr val="lt1"/>
+          </a:fontRef>
+        </p:style>
+        <p:txBody>
+          <a:bodyPr rtlCol="0" anchor="ctr"/>
+          <a:lstStyle/>
+          <a:p>
+            <a:pPr algn="ctr"/>
+            <a:r>
+              <a:rPr lang="es-MX" dirty="0"/>
+              <a:t>e</a:t>
+            </a:r>
+          </a:p>
+        </p:txBody>
+      </p:sp>
+      <p:sp>
+        <p:nvSpPr>
+          <p:cNvPr id="7" name="Rectángulo: esquinas redondeadas 6">
+            <a:extLst>
+              <a:ext uri="{FF2B5EF4-FFF2-40B4-BE49-F238E27FC236}">
+                <a16:creationId xmlns:a16="http://schemas.microsoft.com/office/drawing/2014/main" id="{4A58F37B-32EC-4347-8076-DA6EEDB950B2}"/>
+              </a:ext>
+            </a:extLst>
+          </p:cNvPr>
+          <p:cNvSpPr/>
+          <p:nvPr/>
+        </p:nvSpPr>
+        <p:spPr>
+          <a:xfrm>
+            <a:off x="11339848" y="3429000"/>
+            <a:ext cx="463639" cy="579550"/>
+          </a:xfrm>
+          <a:prstGeom prst="roundRect">
+            <a:avLst/>
+          </a:prstGeom>
+        </p:spPr>
+        <p:style>
+          <a:lnRef idx="2">
+            <a:schemeClr val="dk1">
+              <a:shade val="50000"/>
+            </a:schemeClr>
+          </a:lnRef>
+          <a:fillRef idx="1">
+            <a:schemeClr val="dk1"/>
+          </a:fillRef>
+          <a:effectRef idx="0">
+            <a:schemeClr val="dk1"/>
+          </a:effectRef>
+          <a:fontRef idx="minor">
+            <a:schemeClr val="lt1"/>
+          </a:fontRef>
+        </p:style>
+        <p:txBody>
+          <a:bodyPr rtlCol="0" anchor="ctr"/>
+          <a:lstStyle/>
+          <a:p>
+            <a:pPr algn="ctr"/>
+            <a:r>
+              <a:rPr lang="es-MX" dirty="0"/>
+              <a:t>d</a:t>
+            </a:r>
+          </a:p>
+        </p:txBody>
+      </p:sp>
+      <p:sp>
+        <p:nvSpPr>
+          <p:cNvPr id="2" name="Rectángulo: esquinas redondeadas 1">
+            <a:extLst>
+              <a:ext uri="{FF2B5EF4-FFF2-40B4-BE49-F238E27FC236}">
+                <a16:creationId xmlns:a16="http://schemas.microsoft.com/office/drawing/2014/main" id="{41C30BCD-2FB0-432A-B61C-8194B83ECD87}"/>
+              </a:ext>
+            </a:extLst>
+          </p:cNvPr>
+          <p:cNvSpPr/>
+          <p:nvPr/>
+        </p:nvSpPr>
+        <p:spPr>
+          <a:xfrm>
+            <a:off x="10494135" y="4159876"/>
+            <a:ext cx="1309352" cy="375895"/>
+          </a:xfrm>
+          <a:prstGeom prst="roundRect">
+            <a:avLst/>
+          </a:prstGeom>
+        </p:spPr>
+        <p:style>
+          <a:lnRef idx="2">
+            <a:schemeClr val="accent6">
+              <a:shade val="50000"/>
+            </a:schemeClr>
+          </a:lnRef>
+          <a:fillRef idx="1">
+            <a:schemeClr val="accent6"/>
+          </a:fillRef>
+          <a:effectRef idx="0">
+            <a:schemeClr val="accent6"/>
+          </a:effectRef>
+          <a:fontRef idx="minor">
+            <a:schemeClr val="lt1"/>
+          </a:fontRef>
+        </p:style>
+        <p:txBody>
+          <a:bodyPr rtlCol="0" anchor="ctr"/>
+          <a:lstStyle/>
+          <a:p>
+            <a:pPr algn="ctr"/>
+            <a:r>
+              <a:rPr lang="es-MX" dirty="0"/>
+              <a:t>Datos de contacto</a:t>
+            </a:r>
+          </a:p>
+        </p:txBody>
+      </p:sp>
+    </p:spTree>
+    <p:extLst>
+      <p:ext uri="{BB962C8B-B14F-4D97-AF65-F5344CB8AC3E}">
+        <p14:creationId xmlns:p14="http://schemas.microsoft.com/office/powerpoint/2010/main" val="2092069336"/>
+      </p:ext>
+    </p:extLst>
+  </p:cSld>
+  <p:clrMapOvr>
+    <a:masterClrMapping/>
+  </p:clrMapOvr>
+</p:sld>
+</file>
+
+<file path=ppt/slides/slide5.xml><?xml version="1.0" encoding="utf-8"?>
+<p:sld xmlns:a="http://schemas.openxmlformats.org/drawingml/2006/main" xmlns:r="http://schemas.openxmlformats.org/officeDocument/2006/relationships" xmlns:p="http://schemas.openxmlformats.org/presentationml/2006/main">
+  <p:cSld>
+    <p:spTree>
+      <p:nvGrpSpPr>
+        <p:cNvPr id="1" name=""/>
+        <p:cNvGrpSpPr/>
+        <p:nvPr/>
+      </p:nvGrpSpPr>
+      <p:grpSpPr>
+        <a:xfrm>
+          <a:off x="0" y="0"/>
+          <a:ext cx="0" cy="0"/>
+          <a:chOff x="0" y="0"/>
+          <a:chExt cx="0" cy="0"/>
+        </a:xfrm>
+      </p:grpSpPr>
+      <p:graphicFrame>
+        <p:nvGraphicFramePr>
+          <p:cNvPr id="4" name="Tabla 4">
+            <a:extLst>
+              <a:ext uri="{FF2B5EF4-FFF2-40B4-BE49-F238E27FC236}">
+                <a16:creationId xmlns:a16="http://schemas.microsoft.com/office/drawing/2014/main" id="{9CF7702B-1C09-48B9-9F77-0005200CD139}"/>
+              </a:ext>
+            </a:extLst>
+          </p:cNvPr>
+          <p:cNvGraphicFramePr>
+            <a:graphicFrameLocks noGrp="1"/>
+          </p:cNvGraphicFramePr>
+          <p:nvPr>
+            <p:extLst>
+              <p:ext uri="{D42A27DB-BD31-4B8C-83A1-F6EECF244321}">
+                <p14:modId xmlns:p14="http://schemas.microsoft.com/office/powerpoint/2010/main" val="2819156249"/>
+              </p:ext>
+            </p:extLst>
+          </p:nvPr>
+        </p:nvGraphicFramePr>
+        <p:xfrm>
+          <a:off x="2032000" y="719666"/>
+          <a:ext cx="8128000" cy="2225040"/>
+        </p:xfrm>
+        <a:graphic>
+          <a:graphicData uri="http://schemas.openxmlformats.org/drawingml/2006/table">
+            <a:tbl>
+              <a:tblPr firstRow="1" bandRow="1">
+                <a:tableStyleId>{5C22544A-7EE6-4342-B048-85BDC9FD1C3A}</a:tableStyleId>
+              </a:tblPr>
+              <a:tblGrid>
+                <a:gridCol w="4064000">
+                  <a:extLst>
+                    <a:ext uri="{9D8B030D-6E8A-4147-A177-3AD203B41FA5}">
+                      <a16:colId xmlns:a16="http://schemas.microsoft.com/office/drawing/2014/main" val="2785606157"/>
+                    </a:ext>
+                  </a:extLst>
+                </a:gridCol>
+                <a:gridCol w="4064000">
+                  <a:extLst>
+                    <a:ext uri="{9D8B030D-6E8A-4147-A177-3AD203B41FA5}">
+                      <a16:colId xmlns:a16="http://schemas.microsoft.com/office/drawing/2014/main" val="2559414062"/>
+                    </a:ext>
+                  </a:extLst>
+                </a:gridCol>
+              </a:tblGrid>
+              <a:tr h="370840">
+                <a:tc>
+                  <a:txBody>
+                    <a:bodyPr/>
+                    <a:lstStyle/>
+                    <a:p>
+                      <a:endParaRPr lang="es-MX" dirty="0"/>
+                    </a:p>
+                  </a:txBody>
+                  <a:tcPr/>
+                </a:tc>
+                <a:tc>
+                  <a:txBody>
+                    <a:bodyPr/>
+                    <a:lstStyle/>
+                    <a:p>
+                      <a:endParaRPr lang="es-MX"/>
+                    </a:p>
+                  </a:txBody>
+                  <a:tcPr/>
+                </a:tc>
+                <a:extLst>
+                  <a:ext uri="{0D108BD9-81ED-4DB2-BD59-A6C34878D82A}">
+                    <a16:rowId xmlns:a16="http://schemas.microsoft.com/office/drawing/2014/main" val="3821451958"/>
+                  </a:ext>
+                </a:extLst>
+              </a:tr>
+              <a:tr h="370840">
+                <a:tc>
+                  <a:txBody>
+                    <a:bodyPr/>
+                    <a:lstStyle/>
+                    <a:p>
+                      <a:r>
+                        <a:rPr lang="es-MX" dirty="0"/>
+                        <a:t>nombre</a:t>
+                      </a:r>
+                    </a:p>
+                  </a:txBody>
+                  <a:tcPr/>
+                </a:tc>
+                <a:tc>
+                  <a:txBody>
+                    <a:bodyPr/>
+                    <a:lstStyle/>
+                    <a:p>
+                      <a:endParaRPr lang="es-MX" dirty="0"/>
+                    </a:p>
+                  </a:txBody>
+                  <a:tcPr/>
+                </a:tc>
+                <a:extLst>
+                  <a:ext uri="{0D108BD9-81ED-4DB2-BD59-A6C34878D82A}">
+                    <a16:rowId xmlns:a16="http://schemas.microsoft.com/office/drawing/2014/main" val="3797763111"/>
+                  </a:ext>
+                </a:extLst>
+              </a:tr>
+              <a:tr h="370840">
+                <a:tc>
+                  <a:txBody>
+                    <a:bodyPr/>
+                    <a:lstStyle/>
+                    <a:p>
+                      <a:r>
+                        <a:rPr lang="es-MX" dirty="0"/>
+                        <a:t>apellidos</a:t>
+                      </a:r>
+                    </a:p>
+                  </a:txBody>
+                  <a:tcPr/>
+                </a:tc>
+                <a:tc>
+                  <a:txBody>
+                    <a:bodyPr/>
+                    <a:lstStyle/>
+                    <a:p>
+                      <a:endParaRPr lang="es-MX" dirty="0"/>
+                    </a:p>
+                  </a:txBody>
+                  <a:tcPr/>
+                </a:tc>
+                <a:extLst>
+                  <a:ext uri="{0D108BD9-81ED-4DB2-BD59-A6C34878D82A}">
+                    <a16:rowId xmlns:a16="http://schemas.microsoft.com/office/drawing/2014/main" val="516158536"/>
+                  </a:ext>
+                </a:extLst>
+              </a:tr>
+              <a:tr h="370840">
+                <a:tc>
+                  <a:txBody>
+                    <a:bodyPr/>
+                    <a:lstStyle/>
+                    <a:p>
+                      <a:r>
+                        <a:rPr lang="es-MX" dirty="0" err="1"/>
+                        <a:t>direcion</a:t>
+                      </a:r>
+                      <a:endParaRPr lang="es-MX" dirty="0"/>
+                    </a:p>
+                  </a:txBody>
+                  <a:tcPr/>
+                </a:tc>
+                <a:tc>
+                  <a:txBody>
+                    <a:bodyPr/>
+                    <a:lstStyle/>
+                    <a:p>
+                      <a:endParaRPr lang="es-MX" dirty="0"/>
+                    </a:p>
+                  </a:txBody>
+                  <a:tcPr/>
+                </a:tc>
+                <a:extLst>
+                  <a:ext uri="{0D108BD9-81ED-4DB2-BD59-A6C34878D82A}">
+                    <a16:rowId xmlns:a16="http://schemas.microsoft.com/office/drawing/2014/main" val="1539664037"/>
+                  </a:ext>
+                </a:extLst>
+              </a:tr>
+              <a:tr h="370840">
+                <a:tc>
+                  <a:txBody>
+                    <a:bodyPr/>
+                    <a:lstStyle/>
+                    <a:p>
+                      <a:r>
+                        <a:rPr lang="es-MX" dirty="0"/>
+                        <a:t>genero</a:t>
+                      </a:r>
+                    </a:p>
+                  </a:txBody>
+                  <a:tcPr/>
+                </a:tc>
+                <a:tc>
+                  <a:txBody>
+                    <a:bodyPr/>
+                    <a:lstStyle/>
+                    <a:p>
+                      <a:endParaRPr lang="es-MX" dirty="0"/>
+                    </a:p>
+                  </a:txBody>
+                  <a:tcPr/>
+                </a:tc>
+                <a:extLst>
+                  <a:ext uri="{0D108BD9-81ED-4DB2-BD59-A6C34878D82A}">
+                    <a16:rowId xmlns:a16="http://schemas.microsoft.com/office/drawing/2014/main" val="2444727152"/>
+                  </a:ext>
+                </a:extLst>
+              </a:tr>
+              <a:tr h="370840">
+                <a:tc>
+                  <a:txBody>
+                    <a:bodyPr/>
+                    <a:lstStyle/>
+                    <a:p>
+                      <a:r>
+                        <a:rPr lang="es-MX" dirty="0"/>
+                        <a:t>fecha_ de nacimiento</a:t>
+                      </a:r>
+                    </a:p>
+                  </a:txBody>
+                  <a:tcPr/>
+                </a:tc>
+                <a:tc>
+                  <a:txBody>
+                    <a:bodyPr/>
+                    <a:lstStyle/>
+                    <a:p>
+                      <a:endParaRPr lang="es-MX" dirty="0"/>
+                    </a:p>
+                  </a:txBody>
+                  <a:tcPr/>
+                </a:tc>
+                <a:extLst>
+                  <a:ext uri="{0D108BD9-81ED-4DB2-BD59-A6C34878D82A}">
+                    <a16:rowId xmlns:a16="http://schemas.microsoft.com/office/drawing/2014/main" val="2582453995"/>
+                  </a:ext>
+                </a:extLst>
+              </a:tr>
+            </a:tbl>
+          </a:graphicData>
+        </a:graphic>
+      </p:graphicFrame>
+      <p:sp>
+        <p:nvSpPr>
+          <p:cNvPr id="5" name="Rectángulo: esquinas redondeadas 4">
+            <a:extLst>
+              <a:ext uri="{FF2B5EF4-FFF2-40B4-BE49-F238E27FC236}">
+                <a16:creationId xmlns:a16="http://schemas.microsoft.com/office/drawing/2014/main" id="{90EBE145-9BE6-4D68-821E-2AA4DE65D1E9}"/>
+              </a:ext>
+            </a:extLst>
+          </p:cNvPr>
+          <p:cNvSpPr/>
+          <p:nvPr/>
+        </p:nvSpPr>
+        <p:spPr>
+          <a:xfrm>
+            <a:off x="3219719" y="4932608"/>
+            <a:ext cx="2434107" cy="991673"/>
+          </a:xfrm>
+          <a:prstGeom prst="roundRect">
+            <a:avLst/>
+          </a:prstGeom>
+        </p:spPr>
+        <p:style>
+          <a:lnRef idx="2">
+            <a:schemeClr val="accent6">
+              <a:shade val="50000"/>
+            </a:schemeClr>
+          </a:lnRef>
+          <a:fillRef idx="1">
+            <a:schemeClr val="accent6"/>
+          </a:fillRef>
+          <a:effectRef idx="0">
+            <a:schemeClr val="accent6"/>
+          </a:effectRef>
+          <a:fontRef idx="minor">
+            <a:schemeClr val="lt1"/>
+          </a:fontRef>
+        </p:style>
+        <p:txBody>
+          <a:bodyPr rtlCol="0" anchor="ctr"/>
+          <a:lstStyle/>
+          <a:p>
+            <a:pPr algn="ctr"/>
+            <a:r>
+              <a:rPr lang="es-MX" dirty="0"/>
+              <a:t>guardar</a:t>
+            </a:r>
+          </a:p>
+        </p:txBody>
+      </p:sp>
+      <p:sp>
+        <p:nvSpPr>
+          <p:cNvPr id="6" name="Rectángulo: esquinas redondeadas 5">
+            <a:extLst>
+              <a:ext uri="{FF2B5EF4-FFF2-40B4-BE49-F238E27FC236}">
+                <a16:creationId xmlns:a16="http://schemas.microsoft.com/office/drawing/2014/main" id="{83426878-F7BB-4B3C-92A7-ADF5FCCF53F2}"/>
+              </a:ext>
+            </a:extLst>
+          </p:cNvPr>
+          <p:cNvSpPr/>
+          <p:nvPr/>
+        </p:nvSpPr>
+        <p:spPr>
+          <a:xfrm>
+            <a:off x="6437291" y="4932607"/>
+            <a:ext cx="2434107" cy="991673"/>
+          </a:xfrm>
+          <a:prstGeom prst="roundRect">
+            <a:avLst/>
+          </a:prstGeom>
+        </p:spPr>
+        <p:style>
+          <a:lnRef idx="3">
+            <a:schemeClr val="lt1"/>
+          </a:lnRef>
+          <a:fillRef idx="1">
+            <a:schemeClr val="dk1"/>
+          </a:fillRef>
+          <a:effectRef idx="1">
+            <a:schemeClr val="dk1"/>
+          </a:effectRef>
+          <a:fontRef idx="minor">
+            <a:schemeClr val="lt1"/>
+          </a:fontRef>
+        </p:style>
+        <p:txBody>
+          <a:bodyPr rtlCol="0" anchor="ctr"/>
+          <a:lstStyle/>
+          <a:p>
+            <a:pPr algn="ctr"/>
+            <a:r>
+              <a:rPr lang="es-MX" dirty="0"/>
+              <a:t>Cancelar</a:t>
+            </a:r>
+          </a:p>
+        </p:txBody>
+      </p:sp>
+      <p:graphicFrame>
+        <p:nvGraphicFramePr>
+          <p:cNvPr id="7" name="Tabla 7">
+            <a:extLst>
+              <a:ext uri="{FF2B5EF4-FFF2-40B4-BE49-F238E27FC236}">
+                <a16:creationId xmlns:a16="http://schemas.microsoft.com/office/drawing/2014/main" id="{B3731F23-61A0-4522-AD53-FFE86802A0ED}"/>
+              </a:ext>
+            </a:extLst>
+          </p:cNvPr>
+          <p:cNvGraphicFramePr>
+            <a:graphicFrameLocks noGrp="1"/>
+          </p:cNvGraphicFramePr>
+          <p:nvPr>
+            <p:extLst>
+              <p:ext uri="{D42A27DB-BD31-4B8C-83A1-F6EECF244321}">
+                <p14:modId xmlns:p14="http://schemas.microsoft.com/office/powerpoint/2010/main" val="1235580156"/>
+              </p:ext>
+            </p:extLst>
+          </p:nvPr>
+        </p:nvGraphicFramePr>
+        <p:xfrm>
+          <a:off x="2032000" y="3552686"/>
+          <a:ext cx="8127999" cy="1112520"/>
+        </p:xfrm>
+        <a:graphic>
+          <a:graphicData uri="http://schemas.openxmlformats.org/drawingml/2006/table">
+            <a:tbl>
+              <a:tblPr firstRow="1" bandRow="1">
+                <a:tableStyleId>{5C22544A-7EE6-4342-B048-85BDC9FD1C3A}</a:tableStyleId>
+              </a:tblPr>
+              <a:tblGrid>
+                <a:gridCol w="2709333">
+                  <a:extLst>
+                    <a:ext uri="{9D8B030D-6E8A-4147-A177-3AD203B41FA5}">
+                      <a16:colId xmlns:a16="http://schemas.microsoft.com/office/drawing/2014/main" val="2095872151"/>
+                    </a:ext>
+                  </a:extLst>
+                </a:gridCol>
+                <a:gridCol w="2709333">
+                  <a:extLst>
+                    <a:ext uri="{9D8B030D-6E8A-4147-A177-3AD203B41FA5}">
+                      <a16:colId xmlns:a16="http://schemas.microsoft.com/office/drawing/2014/main" val="3006777102"/>
+                    </a:ext>
+                  </a:extLst>
+                </a:gridCol>
+                <a:gridCol w="2709333">
+                  <a:extLst>
+                    <a:ext uri="{9D8B030D-6E8A-4147-A177-3AD203B41FA5}">
+                      <a16:colId xmlns:a16="http://schemas.microsoft.com/office/drawing/2014/main" val="727519825"/>
+                    </a:ext>
+                  </a:extLst>
+                </a:gridCol>
+              </a:tblGrid>
+              <a:tr h="370840">
+                <a:tc>
+                  <a:txBody>
+                    <a:bodyPr/>
+                    <a:lstStyle/>
+                    <a:p>
+                      <a:r>
+                        <a:rPr lang="es-MX" dirty="0"/>
+                        <a:t>Tipo de dato</a:t>
+                      </a:r>
+                    </a:p>
+                  </a:txBody>
+                  <a:tcPr/>
+                </a:tc>
+                <a:tc>
+                  <a:txBody>
+                    <a:bodyPr/>
+                    <a:lstStyle/>
+                    <a:p>
+                      <a:r>
+                        <a:rPr lang="es-MX" dirty="0"/>
+                        <a:t>contacto</a:t>
+                      </a:r>
+                    </a:p>
+                  </a:txBody>
+                  <a:tcPr/>
+                </a:tc>
+                <a:tc>
+                  <a:txBody>
+                    <a:bodyPr/>
+                    <a:lstStyle/>
+                    <a:p>
+                      <a:r>
+                        <a:rPr lang="es-MX" dirty="0"/>
+                        <a:t>operaciones</a:t>
+                      </a:r>
+                    </a:p>
+                  </a:txBody>
+                  <a:tcPr/>
+                </a:tc>
+                <a:extLst>
+                  <a:ext uri="{0D108BD9-81ED-4DB2-BD59-A6C34878D82A}">
+                    <a16:rowId xmlns:a16="http://schemas.microsoft.com/office/drawing/2014/main" val="1779202246"/>
+                  </a:ext>
+                </a:extLst>
+              </a:tr>
+              <a:tr h="370840">
+                <a:tc>
+                  <a:txBody>
+                    <a:bodyPr/>
+                    <a:lstStyle/>
+                    <a:p>
+                      <a:r>
+                        <a:rPr lang="es-MX" dirty="0" err="1"/>
+                        <a:t>Cat_tipo</a:t>
+                      </a:r>
+                      <a:r>
+                        <a:rPr lang="es-MX" dirty="0"/>
+                        <a:t> dato contacto</a:t>
+                      </a:r>
+                    </a:p>
+                  </a:txBody>
+                  <a:tcPr/>
+                </a:tc>
+                <a:tc>
+                  <a:txBody>
+                    <a:bodyPr/>
+                    <a:lstStyle/>
+                    <a:p>
+                      <a:endParaRPr lang="es-MX"/>
+                    </a:p>
+                  </a:txBody>
+                  <a:tcPr/>
+                </a:tc>
+                <a:tc>
+                  <a:txBody>
+                    <a:bodyPr/>
+                    <a:lstStyle/>
+                    <a:p>
+                      <a:endParaRPr lang="es-MX" dirty="0"/>
+                    </a:p>
+                  </a:txBody>
+                  <a:tcPr/>
+                </a:tc>
+                <a:extLst>
+                  <a:ext uri="{0D108BD9-81ED-4DB2-BD59-A6C34878D82A}">
+                    <a16:rowId xmlns:a16="http://schemas.microsoft.com/office/drawing/2014/main" val="1075607976"/>
+                  </a:ext>
+                </a:extLst>
+              </a:tr>
+              <a:tr h="370840">
+                <a:tc>
+                  <a:txBody>
+                    <a:bodyPr/>
+                    <a:lstStyle/>
+                    <a:p>
+                      <a:endParaRPr lang="es-MX"/>
+                    </a:p>
+                  </a:txBody>
+                  <a:tcPr/>
+                </a:tc>
+                <a:tc>
+                  <a:txBody>
+                    <a:bodyPr/>
+                    <a:lstStyle/>
+                    <a:p>
+                      <a:endParaRPr lang="es-MX"/>
+                    </a:p>
+                  </a:txBody>
+                  <a:tcPr/>
+                </a:tc>
+                <a:tc>
+                  <a:txBody>
+                    <a:bodyPr/>
+                    <a:lstStyle/>
+                    <a:p>
+                      <a:endParaRPr lang="es-MX" dirty="0"/>
+                    </a:p>
+                  </a:txBody>
+                  <a:tcPr/>
+                </a:tc>
+                <a:extLst>
+                  <a:ext uri="{0D108BD9-81ED-4DB2-BD59-A6C34878D82A}">
+                    <a16:rowId xmlns:a16="http://schemas.microsoft.com/office/drawing/2014/main" val="2404453003"/>
+                  </a:ext>
+                </a:extLst>
+              </a:tr>
+            </a:tbl>
+          </a:graphicData>
+        </a:graphic>
+      </p:graphicFrame>
+      <p:sp>
+        <p:nvSpPr>
+          <p:cNvPr id="8" name="Rectángulo: esquinas redondeadas 7">
+            <a:extLst>
+              <a:ext uri="{FF2B5EF4-FFF2-40B4-BE49-F238E27FC236}">
+                <a16:creationId xmlns:a16="http://schemas.microsoft.com/office/drawing/2014/main" id="{56FE28F9-3819-4E54-B3F6-CB665FD1045B}"/>
+              </a:ext>
+            </a:extLst>
+          </p:cNvPr>
+          <p:cNvSpPr/>
+          <p:nvPr/>
+        </p:nvSpPr>
+        <p:spPr>
+          <a:xfrm>
+            <a:off x="9053848" y="3065172"/>
+            <a:ext cx="1468191" cy="363828"/>
+          </a:xfrm>
+          <a:prstGeom prst="roundRect">
+            <a:avLst/>
+          </a:prstGeom>
+        </p:spPr>
+        <p:style>
+          <a:lnRef idx="2">
+            <a:schemeClr val="accent2">
+              <a:shade val="50000"/>
+            </a:schemeClr>
+          </a:lnRef>
+          <a:fillRef idx="1">
+            <a:schemeClr val="accent2"/>
+          </a:fillRef>
+          <a:effectRef idx="0">
+            <a:schemeClr val="accent2"/>
+          </a:effectRef>
+          <a:fontRef idx="minor">
+            <a:schemeClr val="lt1"/>
+          </a:fontRef>
+        </p:style>
+        <p:txBody>
+          <a:bodyPr rtlCol="0" anchor="ctr"/>
+          <a:lstStyle/>
+          <a:p>
+            <a:pPr algn="ctr"/>
+            <a:r>
+              <a:rPr lang="es-MX" dirty="0"/>
+              <a:t>Agregar DC</a:t>
+            </a:r>
+          </a:p>
+        </p:txBody>
+      </p:sp>
+      <p:sp>
+        <p:nvSpPr>
+          <p:cNvPr id="9" name="Rectángulo: esquinas redondeadas 8">
+            <a:extLst>
+              <a:ext uri="{FF2B5EF4-FFF2-40B4-BE49-F238E27FC236}">
+                <a16:creationId xmlns:a16="http://schemas.microsoft.com/office/drawing/2014/main" id="{F9C0297B-020E-4CC1-8583-89480B832519}"/>
+              </a:ext>
+            </a:extLst>
+          </p:cNvPr>
+          <p:cNvSpPr/>
+          <p:nvPr/>
+        </p:nvSpPr>
+        <p:spPr>
+          <a:xfrm>
+            <a:off x="8152327" y="4036980"/>
+            <a:ext cx="1004552" cy="206062"/>
+          </a:xfrm>
+          <a:prstGeom prst="roundRect">
+            <a:avLst/>
+          </a:prstGeom>
+        </p:spPr>
+        <p:style>
+          <a:lnRef idx="2">
+            <a:schemeClr val="accent2">
+              <a:shade val="50000"/>
+            </a:schemeClr>
+          </a:lnRef>
+          <a:fillRef idx="1">
+            <a:schemeClr val="accent2"/>
+          </a:fillRef>
+          <a:effectRef idx="0">
+            <a:schemeClr val="accent2"/>
+          </a:effectRef>
+          <a:fontRef idx="minor">
+            <a:schemeClr val="lt1"/>
+          </a:fontRef>
+        </p:style>
+        <p:txBody>
+          <a:bodyPr rtlCol="0" anchor="ctr"/>
+          <a:lstStyle/>
+          <a:p>
+            <a:pPr algn="ctr"/>
+            <a:r>
+              <a:rPr lang="es-MX" dirty="0"/>
+              <a:t>eliminar</a:t>
+            </a:r>
+          </a:p>
+        </p:txBody>
+      </p:sp>
+    </p:spTree>
+    <p:extLst>
+      <p:ext uri="{BB962C8B-B14F-4D97-AF65-F5344CB8AC3E}">
+        <p14:creationId xmlns:p14="http://schemas.microsoft.com/office/powerpoint/2010/main" val="2121290935"/>
+      </p:ext>
+    </p:extLst>
+  </p:cSld>
+  <p:clrMapOvr>
+    <a:masterClrMapping/>
+  </p:clrMapOvr>
+</p:sld>
+</file>
+
 <file path=ppt/theme/theme1.xml><?xml version="1.0" encoding="utf-8"?>
 <a:theme xmlns:a="http://schemas.openxmlformats.org/drawingml/2006/main" name="Tema de Office">
   <a:themeElements>

</xml_diff>

<commit_message>
capacitacion php puro softura feb 2022 - sesion 5
</commit_message>
<xml_diff>
--- a/documentacion/Presentación1.pptx
+++ b/documentacion/Presentación1.pptx
@@ -10,6 +10,7 @@
     <p:sldId id="258" r:id="rId4"/>
     <p:sldId id="259" r:id="rId5"/>
     <p:sldId id="260" r:id="rId6"/>
+    <p:sldId id="261" r:id="rId7"/>
   </p:sldIdLst>
   <p:sldSz cx="12192000" cy="6858000"/>
   <p:notesSz cx="6858000" cy="9144000"/>
@@ -265,7 +266,7 @@
           <a:p>
             <a:fld id="{8AB06734-7183-4404-A236-7CBFED046C3A}" type="datetimeFigureOut">
               <a:rPr lang="es-MX" smtClean="0"/>
-              <a:t>24/02/2022</a:t>
+              <a:t>25/02/2022</a:t>
             </a:fld>
             <a:endParaRPr lang="es-MX"/>
           </a:p>
@@ -465,7 +466,7 @@
           <a:p>
             <a:fld id="{8AB06734-7183-4404-A236-7CBFED046C3A}" type="datetimeFigureOut">
               <a:rPr lang="es-MX" smtClean="0"/>
-              <a:t>24/02/2022</a:t>
+              <a:t>25/02/2022</a:t>
             </a:fld>
             <a:endParaRPr lang="es-MX"/>
           </a:p>
@@ -675,7 +676,7 @@
           <a:p>
             <a:fld id="{8AB06734-7183-4404-A236-7CBFED046C3A}" type="datetimeFigureOut">
               <a:rPr lang="es-MX" smtClean="0"/>
-              <a:t>24/02/2022</a:t>
+              <a:t>25/02/2022</a:t>
             </a:fld>
             <a:endParaRPr lang="es-MX"/>
           </a:p>
@@ -875,7 +876,7 @@
           <a:p>
             <a:fld id="{8AB06734-7183-4404-A236-7CBFED046C3A}" type="datetimeFigureOut">
               <a:rPr lang="es-MX" smtClean="0"/>
-              <a:t>24/02/2022</a:t>
+              <a:t>25/02/2022</a:t>
             </a:fld>
             <a:endParaRPr lang="es-MX"/>
           </a:p>
@@ -1151,7 +1152,7 @@
           <a:p>
             <a:fld id="{8AB06734-7183-4404-A236-7CBFED046C3A}" type="datetimeFigureOut">
               <a:rPr lang="es-MX" smtClean="0"/>
-              <a:t>24/02/2022</a:t>
+              <a:t>25/02/2022</a:t>
             </a:fld>
             <a:endParaRPr lang="es-MX"/>
           </a:p>
@@ -1419,7 +1420,7 @@
           <a:p>
             <a:fld id="{8AB06734-7183-4404-A236-7CBFED046C3A}" type="datetimeFigureOut">
               <a:rPr lang="es-MX" smtClean="0"/>
-              <a:t>24/02/2022</a:t>
+              <a:t>25/02/2022</a:t>
             </a:fld>
             <a:endParaRPr lang="es-MX"/>
           </a:p>
@@ -1834,7 +1835,7 @@
           <a:p>
             <a:fld id="{8AB06734-7183-4404-A236-7CBFED046C3A}" type="datetimeFigureOut">
               <a:rPr lang="es-MX" smtClean="0"/>
-              <a:t>24/02/2022</a:t>
+              <a:t>25/02/2022</a:t>
             </a:fld>
             <a:endParaRPr lang="es-MX"/>
           </a:p>
@@ -1976,7 +1977,7 @@
           <a:p>
             <a:fld id="{8AB06734-7183-4404-A236-7CBFED046C3A}" type="datetimeFigureOut">
               <a:rPr lang="es-MX" smtClean="0"/>
-              <a:t>24/02/2022</a:t>
+              <a:t>25/02/2022</a:t>
             </a:fld>
             <a:endParaRPr lang="es-MX"/>
           </a:p>
@@ -2089,7 +2090,7 @@
           <a:p>
             <a:fld id="{8AB06734-7183-4404-A236-7CBFED046C3A}" type="datetimeFigureOut">
               <a:rPr lang="es-MX" smtClean="0"/>
-              <a:t>24/02/2022</a:t>
+              <a:t>25/02/2022</a:t>
             </a:fld>
             <a:endParaRPr lang="es-MX"/>
           </a:p>
@@ -2402,7 +2403,7 @@
           <a:p>
             <a:fld id="{8AB06734-7183-4404-A236-7CBFED046C3A}" type="datetimeFigureOut">
               <a:rPr lang="es-MX" smtClean="0"/>
-              <a:t>24/02/2022</a:t>
+              <a:t>25/02/2022</a:t>
             </a:fld>
             <a:endParaRPr lang="es-MX"/>
           </a:p>
@@ -2691,7 +2692,7 @@
           <a:p>
             <a:fld id="{8AB06734-7183-4404-A236-7CBFED046C3A}" type="datetimeFigureOut">
               <a:rPr lang="es-MX" smtClean="0"/>
-              <a:t>24/02/2022</a:t>
+              <a:t>25/02/2022</a:t>
             </a:fld>
             <a:endParaRPr lang="es-MX"/>
           </a:p>
@@ -2934,7 +2935,7 @@
           <a:p>
             <a:fld id="{8AB06734-7183-4404-A236-7CBFED046C3A}" type="datetimeFigureOut">
               <a:rPr lang="es-MX" smtClean="0"/>
-              <a:t>24/02/2022</a:t>
+              <a:t>25/02/2022</a:t>
             </a:fld>
             <a:endParaRPr lang="es-MX"/>
           </a:p>
@@ -5408,6 +5409,134 @@
 </p:sld>
 </file>
 
+<file path=ppt/slides/slide6.xml><?xml version="1.0" encoding="utf-8"?>
+<p:sld xmlns:a="http://schemas.openxmlformats.org/drawingml/2006/main" xmlns:r="http://schemas.openxmlformats.org/officeDocument/2006/relationships" xmlns:p="http://schemas.openxmlformats.org/presentationml/2006/main">
+  <p:cSld>
+    <p:spTree>
+      <p:nvGrpSpPr>
+        <p:cNvPr id="1" name=""/>
+        <p:cNvGrpSpPr/>
+        <p:nvPr/>
+      </p:nvGrpSpPr>
+      <p:grpSpPr>
+        <a:xfrm>
+          <a:off x="0" y="0"/>
+          <a:ext cx="0" cy="0"/>
+          <a:chOff x="0" y="0"/>
+          <a:chExt cx="0" cy="0"/>
+        </a:xfrm>
+      </p:grpSpPr>
+      <p:sp>
+        <p:nvSpPr>
+          <p:cNvPr id="2" name="Título 1">
+            <a:extLst>
+              <a:ext uri="{FF2B5EF4-FFF2-40B4-BE49-F238E27FC236}">
+                <a16:creationId xmlns:a16="http://schemas.microsoft.com/office/drawing/2014/main" id="{3B5693CE-9BEF-47CF-93D5-AA8C199F2D50}"/>
+              </a:ext>
+            </a:extLst>
+          </p:cNvPr>
+          <p:cNvSpPr>
+            <a:spLocks noGrp="1"/>
+          </p:cNvSpPr>
+          <p:nvPr>
+            <p:ph type="title"/>
+          </p:nvPr>
+        </p:nvSpPr>
+        <p:spPr/>
+        <p:txBody>
+          <a:bodyPr/>
+          <a:lstStyle/>
+          <a:p>
+            <a:r>
+              <a:rPr lang="es-MX" dirty="0"/>
+              <a:t>Despliegue de apps web</a:t>
+            </a:r>
+          </a:p>
+        </p:txBody>
+      </p:sp>
+      <p:sp>
+        <p:nvSpPr>
+          <p:cNvPr id="3" name="Marcador de contenido 2">
+            <a:extLst>
+              <a:ext uri="{FF2B5EF4-FFF2-40B4-BE49-F238E27FC236}">
+                <a16:creationId xmlns:a16="http://schemas.microsoft.com/office/drawing/2014/main" id="{B1D2AECC-1C60-48E6-814B-2683B1FCEC75}"/>
+              </a:ext>
+            </a:extLst>
+          </p:cNvPr>
+          <p:cNvSpPr>
+            <a:spLocks noGrp="1"/>
+          </p:cNvSpPr>
+          <p:nvPr>
+            <p:ph idx="1"/>
+          </p:nvPr>
+        </p:nvSpPr>
+        <p:spPr/>
+        <p:txBody>
+          <a:bodyPr/>
+          <a:lstStyle/>
+          <a:p>
+            <a:r>
+              <a:rPr lang="es-MX" dirty="0"/>
+              <a:t>Hosting compartido</a:t>
+            </a:r>
+          </a:p>
+          <a:p>
+            <a:r>
+              <a:rPr lang="es-MX" dirty="0"/>
+              <a:t>Hosting dedicados</a:t>
+            </a:r>
+          </a:p>
+          <a:p>
+            <a:r>
+              <a:rPr lang="es-MX" dirty="0"/>
+              <a:t>Maquinas virtuales (</a:t>
+            </a:r>
+            <a:r>
+              <a:rPr lang="es-MX" dirty="0" err="1"/>
+              <a:t>azure</a:t>
+            </a:r>
+            <a:r>
+              <a:rPr lang="es-MX" dirty="0"/>
+              <a:t>, </a:t>
+            </a:r>
+            <a:r>
+              <a:rPr lang="es-MX" dirty="0" err="1"/>
+              <a:t>aws</a:t>
+            </a:r>
+            <a:r>
+              <a:rPr lang="es-MX" dirty="0"/>
+              <a:t>, Oracle, </a:t>
+            </a:r>
+            <a:r>
+              <a:rPr lang="es-MX" dirty="0" err="1"/>
+              <a:t>alibaba</a:t>
+            </a:r>
+            <a:r>
+              <a:rPr lang="es-MX" dirty="0"/>
+              <a:t>,…)</a:t>
+            </a:r>
+          </a:p>
+          <a:p>
+            <a:r>
+              <a:rPr lang="es-MX" dirty="0"/>
+              <a:t>Maquina fisca para servidor ($$$$$$) seguridad, en servidores, en redes ….</a:t>
+            </a:r>
+          </a:p>
+        </p:txBody>
+      </p:sp>
+    </p:spTree>
+    <p:extLst>
+      <p:ext uri="{BB962C8B-B14F-4D97-AF65-F5344CB8AC3E}">
+        <p14:creationId xmlns:p14="http://schemas.microsoft.com/office/powerpoint/2010/main" val="3053645394"/>
+      </p:ext>
+    </p:extLst>
+  </p:cSld>
+  <p:clrMapOvr>
+    <a:masterClrMapping/>
+  </p:clrMapOvr>
+</p:sld>
+</file>
+
 <file path=ppt/theme/theme1.xml><?xml version="1.0" encoding="utf-8"?>
 <a:theme xmlns:a="http://schemas.openxmlformats.org/drawingml/2006/main" name="Tema de Office">
   <a:themeElements>

</xml_diff>

<commit_message>
actualizacion del curso de cap de php feb22
</commit_message>
<xml_diff>
--- a/documentacion/Presentación1.pptx
+++ b/documentacion/Presentación1.pptx
@@ -266,7 +266,7 @@
           <a:p>
             <a:fld id="{8AB06734-7183-4404-A236-7CBFED046C3A}" type="datetimeFigureOut">
               <a:rPr lang="es-MX" smtClean="0"/>
-              <a:t>25/02/2022</a:t>
+              <a:t>27/02/2022</a:t>
             </a:fld>
             <a:endParaRPr lang="es-MX"/>
           </a:p>
@@ -466,7 +466,7 @@
           <a:p>
             <a:fld id="{8AB06734-7183-4404-A236-7CBFED046C3A}" type="datetimeFigureOut">
               <a:rPr lang="es-MX" smtClean="0"/>
-              <a:t>25/02/2022</a:t>
+              <a:t>27/02/2022</a:t>
             </a:fld>
             <a:endParaRPr lang="es-MX"/>
           </a:p>
@@ -676,7 +676,7 @@
           <a:p>
             <a:fld id="{8AB06734-7183-4404-A236-7CBFED046C3A}" type="datetimeFigureOut">
               <a:rPr lang="es-MX" smtClean="0"/>
-              <a:t>25/02/2022</a:t>
+              <a:t>27/02/2022</a:t>
             </a:fld>
             <a:endParaRPr lang="es-MX"/>
           </a:p>
@@ -876,7 +876,7 @@
           <a:p>
             <a:fld id="{8AB06734-7183-4404-A236-7CBFED046C3A}" type="datetimeFigureOut">
               <a:rPr lang="es-MX" smtClean="0"/>
-              <a:t>25/02/2022</a:t>
+              <a:t>27/02/2022</a:t>
             </a:fld>
             <a:endParaRPr lang="es-MX"/>
           </a:p>
@@ -1152,7 +1152,7 @@
           <a:p>
             <a:fld id="{8AB06734-7183-4404-A236-7CBFED046C3A}" type="datetimeFigureOut">
               <a:rPr lang="es-MX" smtClean="0"/>
-              <a:t>25/02/2022</a:t>
+              <a:t>27/02/2022</a:t>
             </a:fld>
             <a:endParaRPr lang="es-MX"/>
           </a:p>
@@ -1420,7 +1420,7 @@
           <a:p>
             <a:fld id="{8AB06734-7183-4404-A236-7CBFED046C3A}" type="datetimeFigureOut">
               <a:rPr lang="es-MX" smtClean="0"/>
-              <a:t>25/02/2022</a:t>
+              <a:t>27/02/2022</a:t>
             </a:fld>
             <a:endParaRPr lang="es-MX"/>
           </a:p>
@@ -1835,7 +1835,7 @@
           <a:p>
             <a:fld id="{8AB06734-7183-4404-A236-7CBFED046C3A}" type="datetimeFigureOut">
               <a:rPr lang="es-MX" smtClean="0"/>
-              <a:t>25/02/2022</a:t>
+              <a:t>27/02/2022</a:t>
             </a:fld>
             <a:endParaRPr lang="es-MX"/>
           </a:p>
@@ -1977,7 +1977,7 @@
           <a:p>
             <a:fld id="{8AB06734-7183-4404-A236-7CBFED046C3A}" type="datetimeFigureOut">
               <a:rPr lang="es-MX" smtClean="0"/>
-              <a:t>25/02/2022</a:t>
+              <a:t>27/02/2022</a:t>
             </a:fld>
             <a:endParaRPr lang="es-MX"/>
           </a:p>
@@ -2090,7 +2090,7 @@
           <a:p>
             <a:fld id="{8AB06734-7183-4404-A236-7CBFED046C3A}" type="datetimeFigureOut">
               <a:rPr lang="es-MX" smtClean="0"/>
-              <a:t>25/02/2022</a:t>
+              <a:t>27/02/2022</a:t>
             </a:fld>
             <a:endParaRPr lang="es-MX"/>
           </a:p>
@@ -2403,7 +2403,7 @@
           <a:p>
             <a:fld id="{8AB06734-7183-4404-A236-7CBFED046C3A}" type="datetimeFigureOut">
               <a:rPr lang="es-MX" smtClean="0"/>
-              <a:t>25/02/2022</a:t>
+              <a:t>27/02/2022</a:t>
             </a:fld>
             <a:endParaRPr lang="es-MX"/>
           </a:p>
@@ -2692,7 +2692,7 @@
           <a:p>
             <a:fld id="{8AB06734-7183-4404-A236-7CBFED046C3A}" type="datetimeFigureOut">
               <a:rPr lang="es-MX" smtClean="0"/>
-              <a:t>25/02/2022</a:t>
+              <a:t>27/02/2022</a:t>
             </a:fld>
             <a:endParaRPr lang="es-MX"/>
           </a:p>
@@ -2935,7 +2935,7 @@
           <a:p>
             <a:fld id="{8AB06734-7183-4404-A236-7CBFED046C3A}" type="datetimeFigureOut">
               <a:rPr lang="es-MX" smtClean="0"/>
-              <a:t>25/02/2022</a:t>
+              <a:t>27/02/2022</a:t>
             </a:fld>
             <a:endParaRPr lang="es-MX"/>
           </a:p>
@@ -3865,7 +3865,7 @@
           <a:p>
             <a:r>
               <a:rPr lang="es-MX" dirty="0"/>
-              <a:t>Estructura</a:t>
+              <a:t>Estructura de datos</a:t>
             </a:r>
           </a:p>
           <a:p>
@@ -3903,6 +3903,9 @@
               <a:rPr lang="es-MX" dirty="0"/>
               <a:t>Dirección</a:t>
             </a:r>
+          </a:p>
+          <a:p>
+            <a:endParaRPr lang="es-MX" dirty="0"/>
           </a:p>
         </p:txBody>
       </p:sp>

</xml_diff>